<commit_message>
Deployment and Installation Guide
</commit_message>
<xml_diff>
--- a/Doc/CPdiagrams.pptx
+++ b/Doc/CPdiagrams.pptx
@@ -7,6 +7,8 @@
   <p:sldIdLst>
     <p:sldId id="256" r:id="rId2"/>
     <p:sldId id="257" r:id="rId3"/>
+    <p:sldId id="258" r:id="rId4"/>
+    <p:sldId id="259" r:id="rId5"/>
   </p:sldIdLst>
   <p:sldSz cx="12192000" cy="6858000"/>
   <p:notesSz cx="6858000" cy="9144000"/>
@@ -244,7 +246,7 @@
           <a:p>
             <a:fld id="{E156D4EA-B005-1947-A7F4-9E4B9AD96555}" type="datetimeFigureOut">
               <a:rPr lang="en-US" smtClean="0"/>
-              <a:t>3/8/16</a:t>
+              <a:t>4/28/16</a:t>
             </a:fld>
             <a:endParaRPr lang="en-US"/>
           </a:p>
@@ -414,7 +416,7 @@
           <a:p>
             <a:fld id="{E156D4EA-B005-1947-A7F4-9E4B9AD96555}" type="datetimeFigureOut">
               <a:rPr lang="en-US" smtClean="0"/>
-              <a:t>3/8/16</a:t>
+              <a:t>4/28/16</a:t>
             </a:fld>
             <a:endParaRPr lang="en-US"/>
           </a:p>
@@ -594,7 +596,7 @@
           <a:p>
             <a:fld id="{E156D4EA-B005-1947-A7F4-9E4B9AD96555}" type="datetimeFigureOut">
               <a:rPr lang="en-US" smtClean="0"/>
-              <a:t>3/8/16</a:t>
+              <a:t>4/28/16</a:t>
             </a:fld>
             <a:endParaRPr lang="en-US"/>
           </a:p>
@@ -764,7 +766,7 @@
           <a:p>
             <a:fld id="{E156D4EA-B005-1947-A7F4-9E4B9AD96555}" type="datetimeFigureOut">
               <a:rPr lang="en-US" smtClean="0"/>
-              <a:t>3/8/16</a:t>
+              <a:t>4/28/16</a:t>
             </a:fld>
             <a:endParaRPr lang="en-US"/>
           </a:p>
@@ -1010,7 +1012,7 @@
           <a:p>
             <a:fld id="{E156D4EA-B005-1947-A7F4-9E4B9AD96555}" type="datetimeFigureOut">
               <a:rPr lang="en-US" smtClean="0"/>
-              <a:t>3/8/16</a:t>
+              <a:t>4/28/16</a:t>
             </a:fld>
             <a:endParaRPr lang="en-US"/>
           </a:p>
@@ -1242,7 +1244,7 @@
           <a:p>
             <a:fld id="{E156D4EA-B005-1947-A7F4-9E4B9AD96555}" type="datetimeFigureOut">
               <a:rPr lang="en-US" smtClean="0"/>
-              <a:t>3/8/16</a:t>
+              <a:t>4/28/16</a:t>
             </a:fld>
             <a:endParaRPr lang="en-US"/>
           </a:p>
@@ -1609,7 +1611,7 @@
           <a:p>
             <a:fld id="{E156D4EA-B005-1947-A7F4-9E4B9AD96555}" type="datetimeFigureOut">
               <a:rPr lang="en-US" smtClean="0"/>
-              <a:t>3/8/16</a:t>
+              <a:t>4/28/16</a:t>
             </a:fld>
             <a:endParaRPr lang="en-US"/>
           </a:p>
@@ -1727,7 +1729,7 @@
           <a:p>
             <a:fld id="{E156D4EA-B005-1947-A7F4-9E4B9AD96555}" type="datetimeFigureOut">
               <a:rPr lang="en-US" smtClean="0"/>
-              <a:t>3/8/16</a:t>
+              <a:t>4/28/16</a:t>
             </a:fld>
             <a:endParaRPr lang="en-US"/>
           </a:p>
@@ -1822,7 +1824,7 @@
           <a:p>
             <a:fld id="{E156D4EA-B005-1947-A7F4-9E4B9AD96555}" type="datetimeFigureOut">
               <a:rPr lang="en-US" smtClean="0"/>
-              <a:t>3/8/16</a:t>
+              <a:t>4/28/16</a:t>
             </a:fld>
             <a:endParaRPr lang="en-US"/>
           </a:p>
@@ -2099,7 +2101,7 @@
           <a:p>
             <a:fld id="{E156D4EA-B005-1947-A7F4-9E4B9AD96555}" type="datetimeFigureOut">
               <a:rPr lang="en-US" smtClean="0"/>
-              <a:t>3/8/16</a:t>
+              <a:t>4/28/16</a:t>
             </a:fld>
             <a:endParaRPr lang="en-US"/>
           </a:p>
@@ -2352,7 +2354,7 @@
           <a:p>
             <a:fld id="{E156D4EA-B005-1947-A7F4-9E4B9AD96555}" type="datetimeFigureOut">
               <a:rPr lang="en-US" smtClean="0"/>
-              <a:t>3/8/16</a:t>
+              <a:t>4/28/16</a:t>
             </a:fld>
             <a:endParaRPr lang="en-US"/>
           </a:p>
@@ -2565,7 +2567,7 @@
           <a:p>
             <a:fld id="{E156D4EA-B005-1947-A7F4-9E4B9AD96555}" type="datetimeFigureOut">
               <a:rPr lang="en-US" smtClean="0"/>
-              <a:t>3/8/16</a:t>
+              <a:t>4/28/16</a:t>
             </a:fld>
             <a:endParaRPr lang="en-US"/>
           </a:p>
@@ -4944,11 +4946,7 @@
             </a:r>
             <a:r>
               <a:rPr lang="en-US" smtClean="0"/>
-              <a:t> </a:t>
-            </a:r>
-            <a:r>
-              <a:rPr lang="en-US" smtClean="0"/>
-              <a:t>returns </a:t>
+              <a:t> returns </a:t>
             </a:r>
             <a:r>
               <a:rPr lang="en-US" dirty="0" smtClean="0"/>
@@ -5183,6 +5181,2329 @@
     <p:extLst>
       <p:ext uri="{BB962C8B-B14F-4D97-AF65-F5344CB8AC3E}">
         <p14:creationId xmlns:p14="http://schemas.microsoft.com/office/powerpoint/2010/main" val="434131174"/>
+      </p:ext>
+    </p:extLst>
+  </p:cSld>
+  <p:clrMapOvr>
+    <a:masterClrMapping/>
+  </p:clrMapOvr>
+</p:sld>
+</file>
+
+<file path=ppt/slides/slide3.xml><?xml version="1.0" encoding="utf-8"?>
+<p:sld xmlns:a="http://schemas.openxmlformats.org/drawingml/2006/main" xmlns:r="http://schemas.openxmlformats.org/officeDocument/2006/relationships" xmlns:p="http://schemas.openxmlformats.org/presentationml/2006/main">
+  <p:cSld>
+    <p:spTree>
+      <p:nvGrpSpPr>
+        <p:cNvPr id="1" name=""/>
+        <p:cNvGrpSpPr/>
+        <p:nvPr/>
+      </p:nvGrpSpPr>
+      <p:grpSpPr>
+        <a:xfrm>
+          <a:off x="0" y="0"/>
+          <a:ext cx="0" cy="0"/>
+          <a:chOff x="0" y="0"/>
+          <a:chExt cx="0" cy="0"/>
+        </a:xfrm>
+      </p:grpSpPr>
+      <p:sp>
+        <p:nvSpPr>
+          <p:cNvPr id="4" name="Rectangle 3"/>
+          <p:cNvSpPr/>
+          <p:nvPr/>
+        </p:nvSpPr>
+        <p:spPr>
+          <a:xfrm>
+            <a:off x="646386" y="1608088"/>
+            <a:ext cx="2648607" cy="596094"/>
+          </a:xfrm>
+          <a:prstGeom prst="rect">
+            <a:avLst/>
+          </a:prstGeom>
+          <a:noFill/>
+          <a:ln w="31750"/>
+        </p:spPr>
+        <p:style>
+          <a:lnRef idx="2">
+            <a:schemeClr val="accent1">
+              <a:shade val="50000"/>
+            </a:schemeClr>
+          </a:lnRef>
+          <a:fillRef idx="1">
+            <a:schemeClr val="accent1"/>
+          </a:fillRef>
+          <a:effectRef idx="0">
+            <a:schemeClr val="accent1"/>
+          </a:effectRef>
+          <a:fontRef idx="minor">
+            <a:schemeClr val="lt1"/>
+          </a:fontRef>
+        </p:style>
+        <p:txBody>
+          <a:bodyPr rtlCol="0" anchor="ctr"/>
+          <a:lstStyle/>
+          <a:p>
+            <a:pPr algn="ctr"/>
+            <a:endParaRPr lang="en-US"/>
+          </a:p>
+        </p:txBody>
+      </p:sp>
+      <p:sp>
+        <p:nvSpPr>
+          <p:cNvPr id="5" name="TextBox 4"/>
+          <p:cNvSpPr txBox="1"/>
+          <p:nvPr/>
+        </p:nvSpPr>
+        <p:spPr>
+          <a:xfrm>
+            <a:off x="1346577" y="1728797"/>
+            <a:ext cx="1589749" cy="369332"/>
+          </a:xfrm>
+          <a:prstGeom prst="rect">
+            <a:avLst/>
+          </a:prstGeom>
+          <a:noFill/>
+        </p:spPr>
+        <p:txBody>
+          <a:bodyPr wrap="square" rtlCol="0">
+            <a:spAutoFit/>
+          </a:bodyPr>
+          <a:lstStyle/>
+          <a:p>
+            <a:r>
+              <a:rPr lang="en-US" dirty="0" smtClean="0"/>
+              <a:t>Host System</a:t>
+            </a:r>
+            <a:endParaRPr lang="en-US" dirty="0"/>
+          </a:p>
+        </p:txBody>
+      </p:sp>
+      <p:sp>
+        <p:nvSpPr>
+          <p:cNvPr id="6" name="Rectangle 5"/>
+          <p:cNvSpPr/>
+          <p:nvPr/>
+        </p:nvSpPr>
+        <p:spPr>
+          <a:xfrm>
+            <a:off x="1102621" y="353542"/>
+            <a:ext cx="1892123" cy="656705"/>
+          </a:xfrm>
+          <a:prstGeom prst="rect">
+            <a:avLst/>
+          </a:prstGeom>
+          <a:noFill/>
+          <a:ln w="31750"/>
+        </p:spPr>
+        <p:style>
+          <a:lnRef idx="2">
+            <a:schemeClr val="accent1">
+              <a:shade val="50000"/>
+            </a:schemeClr>
+          </a:lnRef>
+          <a:fillRef idx="1">
+            <a:schemeClr val="accent1"/>
+          </a:fillRef>
+          <a:effectRef idx="0">
+            <a:schemeClr val="accent1"/>
+          </a:effectRef>
+          <a:fontRef idx="minor">
+            <a:schemeClr val="lt1"/>
+          </a:fontRef>
+        </p:style>
+        <p:txBody>
+          <a:bodyPr rtlCol="0" anchor="ctr"/>
+          <a:lstStyle/>
+          <a:p>
+            <a:pPr algn="ctr"/>
+            <a:endParaRPr lang="en-US"/>
+          </a:p>
+        </p:txBody>
+      </p:sp>
+      <p:sp>
+        <p:nvSpPr>
+          <p:cNvPr id="7" name="TextBox 6"/>
+          <p:cNvSpPr txBox="1"/>
+          <p:nvPr/>
+        </p:nvSpPr>
+        <p:spPr>
+          <a:xfrm>
+            <a:off x="1102621" y="371980"/>
+            <a:ext cx="2192373" cy="646331"/>
+          </a:xfrm>
+          <a:prstGeom prst="rect">
+            <a:avLst/>
+          </a:prstGeom>
+          <a:noFill/>
+        </p:spPr>
+        <p:txBody>
+          <a:bodyPr wrap="square" rtlCol="0">
+            <a:spAutoFit/>
+          </a:bodyPr>
+          <a:lstStyle/>
+          <a:p>
+            <a:r>
+              <a:rPr lang="en-US" dirty="0" err="1"/>
+              <a:t>s</a:t>
+            </a:r>
+            <a:r>
+              <a:rPr lang="en-US" dirty="0" err="1" smtClean="0"/>
+              <a:t>impleclient</a:t>
+            </a:r>
+            <a:r>
+              <a:rPr lang="en-US" dirty="0" smtClean="0"/>
+              <a:t> or</a:t>
+            </a:r>
+          </a:p>
+          <a:p>
+            <a:r>
+              <a:rPr lang="en-US" dirty="0" err="1" smtClean="0"/>
+              <a:t>simpleserver</a:t>
+            </a:r>
+            <a:endParaRPr lang="en-US" dirty="0"/>
+          </a:p>
+        </p:txBody>
+      </p:sp>
+      <p:sp>
+        <p:nvSpPr>
+          <p:cNvPr id="10" name="Rectangle 9"/>
+          <p:cNvSpPr/>
+          <p:nvPr/>
+        </p:nvSpPr>
+        <p:spPr>
+          <a:xfrm>
+            <a:off x="5481150" y="353542"/>
+            <a:ext cx="2568836" cy="1020663"/>
+          </a:xfrm>
+          <a:prstGeom prst="rect">
+            <a:avLst/>
+          </a:prstGeom>
+          <a:noFill/>
+          <a:ln w="31750"/>
+        </p:spPr>
+        <p:style>
+          <a:lnRef idx="2">
+            <a:schemeClr val="accent1">
+              <a:shade val="50000"/>
+            </a:schemeClr>
+          </a:lnRef>
+          <a:fillRef idx="1">
+            <a:schemeClr val="accent1"/>
+          </a:fillRef>
+          <a:effectRef idx="0">
+            <a:schemeClr val="accent1"/>
+          </a:effectRef>
+          <a:fontRef idx="minor">
+            <a:schemeClr val="lt1"/>
+          </a:fontRef>
+        </p:style>
+        <p:txBody>
+          <a:bodyPr rtlCol="0" anchor="ctr"/>
+          <a:lstStyle/>
+          <a:p>
+            <a:pPr algn="ctr"/>
+            <a:endParaRPr lang="en-US"/>
+          </a:p>
+        </p:txBody>
+      </p:sp>
+      <p:sp>
+        <p:nvSpPr>
+          <p:cNvPr id="11" name="TextBox 10"/>
+          <p:cNvSpPr txBox="1"/>
+          <p:nvPr/>
+        </p:nvSpPr>
+        <p:spPr>
+          <a:xfrm>
+            <a:off x="5686102" y="609598"/>
+            <a:ext cx="2270938" cy="369332"/>
+          </a:xfrm>
+          <a:prstGeom prst="rect">
+            <a:avLst/>
+          </a:prstGeom>
+          <a:noFill/>
+        </p:spPr>
+        <p:txBody>
+          <a:bodyPr wrap="square" rtlCol="0">
+            <a:spAutoFit/>
+          </a:bodyPr>
+          <a:lstStyle/>
+          <a:p>
+            <a:r>
+              <a:rPr lang="en-US" dirty="0" err="1"/>
+              <a:t>CPSecretService</a:t>
+            </a:r>
+            <a:endParaRPr lang="en-US" sz="1600" dirty="0"/>
+          </a:p>
+        </p:txBody>
+      </p:sp>
+      <p:cxnSp>
+        <p:nvCxnSpPr>
+          <p:cNvPr id="21" name="Straight Arrow Connector 20"/>
+          <p:cNvCxnSpPr/>
+          <p:nvPr/>
+        </p:nvCxnSpPr>
+        <p:spPr>
+          <a:xfrm>
+            <a:off x="1555429" y="1030009"/>
+            <a:ext cx="0" cy="578078"/>
+          </a:xfrm>
+          <a:prstGeom prst="straightConnector1">
+            <a:avLst/>
+          </a:prstGeom>
+          <a:ln w="34925">
+            <a:tailEnd type="triangle"/>
+          </a:ln>
+        </p:spPr>
+        <p:style>
+          <a:lnRef idx="1">
+            <a:schemeClr val="accent1"/>
+          </a:lnRef>
+          <a:fillRef idx="0">
+            <a:schemeClr val="accent1"/>
+          </a:fillRef>
+          <a:effectRef idx="0">
+            <a:schemeClr val="accent1"/>
+          </a:effectRef>
+          <a:fontRef idx="minor">
+            <a:schemeClr val="tx1"/>
+          </a:fontRef>
+        </p:style>
+      </p:cxnSp>
+      <p:cxnSp>
+        <p:nvCxnSpPr>
+          <p:cNvPr id="22" name="Straight Arrow Connector 21"/>
+          <p:cNvCxnSpPr/>
+          <p:nvPr/>
+        </p:nvCxnSpPr>
+        <p:spPr>
+          <a:xfrm>
+            <a:off x="1970317" y="1024749"/>
+            <a:ext cx="0" cy="578078"/>
+          </a:xfrm>
+          <a:prstGeom prst="straightConnector1">
+            <a:avLst/>
+          </a:prstGeom>
+          <a:ln w="34925">
+            <a:headEnd type="triangle"/>
+            <a:tailEnd type="none" w="med" len="med"/>
+          </a:ln>
+        </p:spPr>
+        <p:style>
+          <a:lnRef idx="1">
+            <a:schemeClr val="accent1"/>
+          </a:lnRef>
+          <a:fillRef idx="0">
+            <a:schemeClr val="accent1"/>
+          </a:fillRef>
+          <a:effectRef idx="0">
+            <a:schemeClr val="accent1"/>
+          </a:effectRef>
+          <a:fontRef idx="minor">
+            <a:schemeClr val="tx1"/>
+          </a:fontRef>
+        </p:style>
+      </p:cxnSp>
+      <p:sp>
+        <p:nvSpPr>
+          <p:cNvPr id="23" name="TextBox 22"/>
+          <p:cNvSpPr txBox="1"/>
+          <p:nvPr/>
+        </p:nvSpPr>
+        <p:spPr>
+          <a:xfrm>
+            <a:off x="1161393" y="1140362"/>
+            <a:ext cx="288862" cy="338554"/>
+          </a:xfrm>
+          <a:prstGeom prst="rect">
+            <a:avLst/>
+          </a:prstGeom>
+          <a:noFill/>
+        </p:spPr>
+        <p:txBody>
+          <a:bodyPr wrap="none" rtlCol="0">
+            <a:spAutoFit/>
+          </a:bodyPr>
+          <a:lstStyle/>
+          <a:p>
+            <a:r>
+              <a:rPr lang="en-US" sz="1600" dirty="0"/>
+              <a:t>4</a:t>
+            </a:r>
+            <a:endParaRPr lang="en-US" sz="1600" dirty="0"/>
+          </a:p>
+        </p:txBody>
+      </p:sp>
+      <p:sp>
+        <p:nvSpPr>
+          <p:cNvPr id="38" name="TextBox 37"/>
+          <p:cNvSpPr txBox="1"/>
+          <p:nvPr/>
+        </p:nvSpPr>
+        <p:spPr>
+          <a:xfrm>
+            <a:off x="4597353" y="6327704"/>
+            <a:ext cx="2372957" cy="400110"/>
+          </a:xfrm>
+          <a:prstGeom prst="rect">
+            <a:avLst/>
+          </a:prstGeom>
+          <a:noFill/>
+        </p:spPr>
+        <p:txBody>
+          <a:bodyPr wrap="none" rtlCol="0">
+            <a:spAutoFit/>
+          </a:bodyPr>
+          <a:lstStyle/>
+          <a:p>
+            <a:r>
+              <a:rPr lang="en-US" sz="2000" b="1" dirty="0" smtClean="0"/>
+              <a:t>Getting content keys</a:t>
+            </a:r>
+            <a:endParaRPr lang="en-US" b="1" dirty="0"/>
+          </a:p>
+        </p:txBody>
+      </p:sp>
+      <p:sp>
+        <p:nvSpPr>
+          <p:cNvPr id="40" name="TextBox 39"/>
+          <p:cNvSpPr txBox="1"/>
+          <p:nvPr/>
+        </p:nvSpPr>
+        <p:spPr>
+          <a:xfrm>
+            <a:off x="1671148" y="1135102"/>
+            <a:ext cx="288862" cy="338554"/>
+          </a:xfrm>
+          <a:prstGeom prst="rect">
+            <a:avLst/>
+          </a:prstGeom>
+          <a:noFill/>
+        </p:spPr>
+        <p:txBody>
+          <a:bodyPr wrap="none" rtlCol="0">
+            <a:spAutoFit/>
+          </a:bodyPr>
+          <a:lstStyle/>
+          <a:p>
+            <a:r>
+              <a:rPr lang="en-US" sz="1600" dirty="0" smtClean="0"/>
+              <a:t>5</a:t>
+            </a:r>
+            <a:endParaRPr lang="en-US" sz="1600" dirty="0"/>
+          </a:p>
+        </p:txBody>
+      </p:sp>
+      <p:cxnSp>
+        <p:nvCxnSpPr>
+          <p:cNvPr id="42" name="Straight Arrow Connector 41"/>
+          <p:cNvCxnSpPr/>
+          <p:nvPr/>
+        </p:nvCxnSpPr>
+        <p:spPr>
+          <a:xfrm>
+            <a:off x="3005958" y="696724"/>
+            <a:ext cx="2464676" cy="0"/>
+          </a:xfrm>
+          <a:prstGeom prst="straightConnector1">
+            <a:avLst/>
+          </a:prstGeom>
+          <a:ln w="31750">
+            <a:tailEnd type="triangle"/>
+          </a:ln>
+        </p:spPr>
+        <p:style>
+          <a:lnRef idx="1">
+            <a:schemeClr val="accent1"/>
+          </a:lnRef>
+          <a:fillRef idx="0">
+            <a:schemeClr val="accent1"/>
+          </a:fillRef>
+          <a:effectRef idx="0">
+            <a:schemeClr val="accent1"/>
+          </a:effectRef>
+          <a:fontRef idx="minor">
+            <a:schemeClr val="tx1"/>
+          </a:fontRef>
+        </p:style>
+      </p:cxnSp>
+      <p:cxnSp>
+        <p:nvCxnSpPr>
+          <p:cNvPr id="44" name="Straight Arrow Connector 43"/>
+          <p:cNvCxnSpPr/>
+          <p:nvPr/>
+        </p:nvCxnSpPr>
+        <p:spPr>
+          <a:xfrm>
+            <a:off x="3016464" y="895042"/>
+            <a:ext cx="2464676" cy="0"/>
+          </a:xfrm>
+          <a:prstGeom prst="straightConnector1">
+            <a:avLst/>
+          </a:prstGeom>
+          <a:ln w="31750">
+            <a:headEnd type="triangle" w="med" len="med"/>
+            <a:tailEnd type="none"/>
+          </a:ln>
+        </p:spPr>
+        <p:style>
+          <a:lnRef idx="1">
+            <a:schemeClr val="accent1"/>
+          </a:lnRef>
+          <a:fillRef idx="0">
+            <a:schemeClr val="accent1"/>
+          </a:fillRef>
+          <a:effectRef idx="0">
+            <a:schemeClr val="accent1"/>
+          </a:effectRef>
+          <a:fontRef idx="minor">
+            <a:schemeClr val="tx1"/>
+          </a:fontRef>
+        </p:style>
+      </p:cxnSp>
+      <p:cxnSp>
+        <p:nvCxnSpPr>
+          <p:cNvPr id="45" name="Straight Arrow Connector 44"/>
+          <p:cNvCxnSpPr/>
+          <p:nvPr/>
+        </p:nvCxnSpPr>
+        <p:spPr>
+          <a:xfrm>
+            <a:off x="2894893" y="1015125"/>
+            <a:ext cx="605052" cy="396976"/>
+          </a:xfrm>
+          <a:prstGeom prst="straightConnector1">
+            <a:avLst/>
+          </a:prstGeom>
+          <a:ln w="34925">
+            <a:tailEnd type="triangle"/>
+          </a:ln>
+        </p:spPr>
+        <p:style>
+          <a:lnRef idx="1">
+            <a:schemeClr val="accent1"/>
+          </a:lnRef>
+          <a:fillRef idx="0">
+            <a:schemeClr val="accent1"/>
+          </a:fillRef>
+          <a:effectRef idx="0">
+            <a:schemeClr val="accent1"/>
+          </a:effectRef>
+          <a:fontRef idx="minor">
+            <a:schemeClr val="tx1"/>
+          </a:fontRef>
+        </p:style>
+      </p:cxnSp>
+      <p:sp>
+        <p:nvSpPr>
+          <p:cNvPr id="47" name="Can 46"/>
+          <p:cNvSpPr/>
+          <p:nvPr/>
+        </p:nvSpPr>
+        <p:spPr>
+          <a:xfrm>
+            <a:off x="3515704" y="1261241"/>
+            <a:ext cx="867103" cy="709449"/>
+          </a:xfrm>
+          <a:prstGeom prst="can">
+            <a:avLst/>
+          </a:prstGeom>
+          <a:noFill/>
+          <a:ln w="31750"/>
+        </p:spPr>
+        <p:style>
+          <a:lnRef idx="2">
+            <a:schemeClr val="accent1">
+              <a:shade val="50000"/>
+            </a:schemeClr>
+          </a:lnRef>
+          <a:fillRef idx="1">
+            <a:schemeClr val="accent1"/>
+          </a:fillRef>
+          <a:effectRef idx="0">
+            <a:schemeClr val="accent1"/>
+          </a:effectRef>
+          <a:fontRef idx="minor">
+            <a:schemeClr val="lt1"/>
+          </a:fontRef>
+        </p:style>
+        <p:txBody>
+          <a:bodyPr rtlCol="0" anchor="ctr"/>
+          <a:lstStyle/>
+          <a:p>
+            <a:pPr algn="ctr"/>
+            <a:endParaRPr lang="en-US"/>
+          </a:p>
+        </p:txBody>
+      </p:sp>
+      <p:sp>
+        <p:nvSpPr>
+          <p:cNvPr id="49" name="TextBox 48"/>
+          <p:cNvSpPr txBox="1"/>
+          <p:nvPr/>
+        </p:nvSpPr>
+        <p:spPr>
+          <a:xfrm flipH="1">
+            <a:off x="4828395" y="900823"/>
+            <a:ext cx="435487" cy="338554"/>
+          </a:xfrm>
+          <a:prstGeom prst="rect">
+            <a:avLst/>
+          </a:prstGeom>
+          <a:noFill/>
+        </p:spPr>
+        <p:txBody>
+          <a:bodyPr wrap="square" rtlCol="0">
+            <a:spAutoFit/>
+          </a:bodyPr>
+          <a:lstStyle/>
+          <a:p>
+            <a:r>
+              <a:rPr lang="en-US" sz="1600" dirty="0"/>
+              <a:t>3</a:t>
+            </a:r>
+            <a:endParaRPr lang="en-US" sz="1600" dirty="0"/>
+          </a:p>
+        </p:txBody>
+      </p:sp>
+      <p:sp>
+        <p:nvSpPr>
+          <p:cNvPr id="58" name="TextBox 57"/>
+          <p:cNvSpPr txBox="1"/>
+          <p:nvPr/>
+        </p:nvSpPr>
+        <p:spPr>
+          <a:xfrm>
+            <a:off x="432048" y="2560467"/>
+            <a:ext cx="7648197" cy="4154984"/>
+          </a:xfrm>
+          <a:prstGeom prst="rect">
+            <a:avLst/>
+          </a:prstGeom>
+          <a:noFill/>
+        </p:spPr>
+        <p:txBody>
+          <a:bodyPr wrap="square" rtlCol="0">
+            <a:spAutoFit/>
+          </a:bodyPr>
+          <a:lstStyle/>
+          <a:p>
+            <a:r>
+              <a:rPr lang="en-US" b="1" dirty="0" smtClean="0"/>
+              <a:t>To get symmetric keys protecting stored data from </a:t>
+            </a:r>
+            <a:r>
+              <a:rPr lang="en-US" b="1" dirty="0" err="1"/>
+              <a:t>CPSecretService</a:t>
+            </a:r>
+            <a:endParaRPr lang="en-US" b="1" dirty="0" smtClean="0"/>
+          </a:p>
+          <a:p>
+            <a:pPr marL="342900" indent="-342900">
+              <a:buFont typeface="+mj-lt"/>
+              <a:buAutoNum type="arabicPeriod"/>
+            </a:pPr>
+            <a:r>
+              <a:rPr lang="en-US" dirty="0" err="1" smtClean="0"/>
+              <a:t>Si</a:t>
+            </a:r>
+            <a:r>
+              <a:rPr lang="en-US" dirty="0" err="1" smtClean="0"/>
+              <a:t>mpleclient</a:t>
+            </a:r>
+            <a:r>
+              <a:rPr lang="en-US" dirty="0" smtClean="0"/>
+              <a:t> retrieve program private key and opens Tao Channel to </a:t>
+            </a:r>
+            <a:r>
+              <a:rPr lang="en-US" dirty="0" err="1" smtClean="0"/>
+              <a:t>CPSecretService</a:t>
+            </a:r>
+            <a:r>
+              <a:rPr lang="en-US" dirty="0"/>
+              <a:t>. </a:t>
+            </a:r>
+            <a:r>
+              <a:rPr lang="en-US" dirty="0" err="1" smtClean="0"/>
+              <a:t>CPSecretService</a:t>
+            </a:r>
+            <a:r>
+              <a:rPr lang="en-US" dirty="0" smtClean="0"/>
+              <a:t> and </a:t>
+            </a:r>
+            <a:r>
+              <a:rPr lang="en-US" dirty="0" err="1" smtClean="0"/>
+              <a:t>Simpleclient</a:t>
+            </a:r>
+            <a:r>
+              <a:rPr lang="en-US" dirty="0" smtClean="0"/>
+              <a:t> use Program Certificates and policy public key to open authenticated, encrypted, integrity protected channel.</a:t>
+            </a:r>
+            <a:endParaRPr lang="en-US" dirty="0" smtClean="0"/>
+          </a:p>
+          <a:p>
+            <a:pPr marL="342900" indent="-342900">
+              <a:buFont typeface="+mj-lt"/>
+              <a:buAutoNum type="arabicPeriod"/>
+            </a:pPr>
+            <a:r>
+              <a:rPr lang="en-US" dirty="0" smtClean="0"/>
+              <a:t>Simple service formats request for key disclosure naming (</a:t>
+            </a:r>
+            <a:r>
+              <a:rPr lang="en-US" dirty="0" err="1" smtClean="0"/>
+              <a:t>keyName</a:t>
+            </a:r>
+            <a:r>
+              <a:rPr lang="en-US" dirty="0" smtClean="0"/>
+              <a:t>, epoch) for keys it wants and sends request over Tao Channel </a:t>
+            </a:r>
+            <a:r>
+              <a:rPr lang="en-US" dirty="0"/>
+              <a:t>to </a:t>
+            </a:r>
+            <a:r>
+              <a:rPr lang="en-US" dirty="0" err="1" smtClean="0"/>
+              <a:t>CPSecretService</a:t>
+            </a:r>
+            <a:r>
+              <a:rPr lang="en-US" dirty="0" smtClean="0"/>
+              <a:t>.</a:t>
+            </a:r>
+          </a:p>
+          <a:p>
+            <a:pPr marL="342900" indent="-342900">
+              <a:buFont typeface="+mj-lt"/>
+              <a:buAutoNum type="arabicPeriod"/>
+            </a:pPr>
+            <a:r>
+              <a:rPr lang="en-US" dirty="0" err="1" smtClean="0"/>
+              <a:t>CPSecretService</a:t>
+            </a:r>
+            <a:r>
+              <a:rPr lang="en-US" dirty="0" smtClean="0"/>
+              <a:t> checks whether </a:t>
+            </a:r>
+            <a:r>
+              <a:rPr lang="en-US" dirty="0" err="1" smtClean="0"/>
+              <a:t>simpleclient’s</a:t>
+            </a:r>
+            <a:r>
+              <a:rPr lang="en-US" dirty="0" smtClean="0"/>
+              <a:t> Program Principal is on ACL list for the named key, if so, it returns the key value over the Tao Channel.</a:t>
+            </a:r>
+          </a:p>
+          <a:p>
+            <a:pPr marL="342900" indent="-342900">
+              <a:buFont typeface="+mj-lt"/>
+              <a:buAutoNum type="arabicPeriod"/>
+            </a:pPr>
+            <a:r>
+              <a:rPr lang="en-US" dirty="0" smtClean="0"/>
+              <a:t>In steps 4, 5 and 6, </a:t>
+            </a:r>
+            <a:r>
+              <a:rPr lang="en-US" dirty="0" err="1" smtClean="0"/>
+              <a:t>simpleclient</a:t>
+            </a:r>
+            <a:r>
+              <a:rPr lang="en-US" dirty="0" smtClean="0"/>
+              <a:t> seals the content key and stores it for subsequent invocations.</a:t>
+            </a:r>
+          </a:p>
+          <a:p>
+            <a:pPr marL="342900" indent="-342900">
+              <a:buFont typeface="+mj-lt"/>
+              <a:buAutoNum type="arabicPeriod"/>
+            </a:pPr>
+            <a:endParaRPr lang="en-US" dirty="0"/>
+          </a:p>
+          <a:p>
+            <a:pPr marL="342900" indent="-342900">
+              <a:buFont typeface="Wingdings" charset="2"/>
+              <a:buChar char="q"/>
+            </a:pPr>
+            <a:r>
+              <a:rPr lang="en-US" dirty="0" smtClean="0"/>
+              <a:t>Sequence may start at step 0 when </a:t>
+            </a:r>
+            <a:r>
+              <a:rPr lang="en-US" dirty="0" err="1" smtClean="0"/>
+              <a:t>simpleclient</a:t>
+            </a:r>
+            <a:r>
+              <a:rPr lang="en-US" dirty="0" smtClean="0"/>
+              <a:t> is notified that a key has been rotated (i.e. – has a new epoch)</a:t>
+            </a:r>
+          </a:p>
+          <a:p>
+            <a:pPr marL="342900" indent="-342900">
+              <a:buFont typeface="+mj-lt"/>
+              <a:buAutoNum type="arabicPeriod"/>
+            </a:pPr>
+            <a:endParaRPr lang="en-US" sz="1200" dirty="0"/>
+          </a:p>
+        </p:txBody>
+      </p:sp>
+      <p:sp>
+        <p:nvSpPr>
+          <p:cNvPr id="67" name="TextBox 66"/>
+          <p:cNvSpPr txBox="1"/>
+          <p:nvPr/>
+        </p:nvSpPr>
+        <p:spPr>
+          <a:xfrm flipH="1">
+            <a:off x="4377010" y="405972"/>
+            <a:ext cx="435487" cy="338554"/>
+          </a:xfrm>
+          <a:prstGeom prst="rect">
+            <a:avLst/>
+          </a:prstGeom>
+          <a:noFill/>
+        </p:spPr>
+        <p:txBody>
+          <a:bodyPr wrap="square" rtlCol="0">
+            <a:spAutoFit/>
+          </a:bodyPr>
+          <a:lstStyle/>
+          <a:p>
+            <a:r>
+              <a:rPr lang="en-US" sz="1600" dirty="0"/>
+              <a:t>2</a:t>
+            </a:r>
+            <a:endParaRPr lang="en-US" sz="1600" dirty="0"/>
+          </a:p>
+        </p:txBody>
+      </p:sp>
+      <p:sp>
+        <p:nvSpPr>
+          <p:cNvPr id="71" name="TextBox 70"/>
+          <p:cNvSpPr txBox="1"/>
+          <p:nvPr/>
+        </p:nvSpPr>
+        <p:spPr>
+          <a:xfrm>
+            <a:off x="6785808" y="1005905"/>
+            <a:ext cx="787139" cy="369332"/>
+          </a:xfrm>
+          <a:prstGeom prst="rect">
+            <a:avLst/>
+          </a:prstGeom>
+          <a:noFill/>
+        </p:spPr>
+        <p:txBody>
+          <a:bodyPr wrap="none" rtlCol="0">
+            <a:spAutoFit/>
+          </a:bodyPr>
+          <a:lstStyle/>
+          <a:p>
+            <a:r>
+              <a:rPr lang="en-US" dirty="0" err="1"/>
+              <a:t>P</a:t>
+            </a:r>
+            <a:r>
+              <a:rPr lang="en-US" dirty="0" err="1" smtClean="0"/>
+              <a:t>K</a:t>
+            </a:r>
+            <a:r>
+              <a:rPr lang="en-US" baseline="-25000" dirty="0" err="1" smtClean="0"/>
+              <a:t>policy</a:t>
+            </a:r>
+            <a:endParaRPr lang="en-US" baseline="-25000" dirty="0"/>
+          </a:p>
+        </p:txBody>
+      </p:sp>
+      <p:cxnSp>
+        <p:nvCxnSpPr>
+          <p:cNvPr id="26" name="Straight Arrow Connector 25"/>
+          <p:cNvCxnSpPr/>
+          <p:nvPr/>
+        </p:nvCxnSpPr>
+        <p:spPr>
+          <a:xfrm>
+            <a:off x="244929" y="744526"/>
+            <a:ext cx="838754" cy="0"/>
+          </a:xfrm>
+          <a:prstGeom prst="straightConnector1">
+            <a:avLst/>
+          </a:prstGeom>
+          <a:ln w="31750">
+            <a:solidFill>
+              <a:srgbClr val="FF0000"/>
+            </a:solidFill>
+            <a:tailEnd type="triangle"/>
+          </a:ln>
+        </p:spPr>
+        <p:style>
+          <a:lnRef idx="1">
+            <a:schemeClr val="accent1"/>
+          </a:lnRef>
+          <a:fillRef idx="0">
+            <a:schemeClr val="accent1"/>
+          </a:fillRef>
+          <a:effectRef idx="0">
+            <a:schemeClr val="accent1"/>
+          </a:effectRef>
+          <a:fontRef idx="minor">
+            <a:schemeClr val="tx1"/>
+          </a:fontRef>
+        </p:style>
+      </p:cxnSp>
+      <p:sp>
+        <p:nvSpPr>
+          <p:cNvPr id="28" name="TextBox 27"/>
+          <p:cNvSpPr txBox="1"/>
+          <p:nvPr/>
+        </p:nvSpPr>
+        <p:spPr>
+          <a:xfrm>
+            <a:off x="432048" y="280391"/>
+            <a:ext cx="288862" cy="338554"/>
+          </a:xfrm>
+          <a:prstGeom prst="rect">
+            <a:avLst/>
+          </a:prstGeom>
+          <a:noFill/>
+        </p:spPr>
+        <p:txBody>
+          <a:bodyPr wrap="none" rtlCol="0">
+            <a:spAutoFit/>
+          </a:bodyPr>
+          <a:lstStyle/>
+          <a:p>
+            <a:r>
+              <a:rPr lang="en-US" sz="1600" dirty="0" smtClean="0"/>
+              <a:t>0</a:t>
+            </a:r>
+            <a:endParaRPr lang="en-US" sz="1600" dirty="0"/>
+          </a:p>
+        </p:txBody>
+      </p:sp>
+      <p:cxnSp>
+        <p:nvCxnSpPr>
+          <p:cNvPr id="29" name="Straight Arrow Connector 28"/>
+          <p:cNvCxnSpPr/>
+          <p:nvPr/>
+        </p:nvCxnSpPr>
+        <p:spPr>
+          <a:xfrm>
+            <a:off x="8011686" y="893013"/>
+            <a:ext cx="634818" cy="305989"/>
+          </a:xfrm>
+          <a:prstGeom prst="straightConnector1">
+            <a:avLst/>
+          </a:prstGeom>
+          <a:ln w="34925">
+            <a:tailEnd type="triangle"/>
+          </a:ln>
+        </p:spPr>
+        <p:style>
+          <a:lnRef idx="1">
+            <a:schemeClr val="accent1"/>
+          </a:lnRef>
+          <a:fillRef idx="0">
+            <a:schemeClr val="accent1"/>
+          </a:fillRef>
+          <a:effectRef idx="0">
+            <a:schemeClr val="accent1"/>
+          </a:effectRef>
+          <a:fontRef idx="minor">
+            <a:schemeClr val="tx1"/>
+          </a:fontRef>
+        </p:style>
+      </p:cxnSp>
+      <p:sp>
+        <p:nvSpPr>
+          <p:cNvPr id="30" name="Can 29"/>
+          <p:cNvSpPr/>
+          <p:nvPr/>
+        </p:nvSpPr>
+        <p:spPr>
+          <a:xfrm>
+            <a:off x="8408396" y="1024749"/>
+            <a:ext cx="3783604" cy="4884501"/>
+          </a:xfrm>
+          <a:prstGeom prst="can">
+            <a:avLst/>
+          </a:prstGeom>
+          <a:noFill/>
+          <a:ln w="31750"/>
+        </p:spPr>
+        <p:style>
+          <a:lnRef idx="2">
+            <a:schemeClr val="accent1">
+              <a:shade val="50000"/>
+            </a:schemeClr>
+          </a:lnRef>
+          <a:fillRef idx="1">
+            <a:schemeClr val="accent1"/>
+          </a:fillRef>
+          <a:effectRef idx="0">
+            <a:schemeClr val="accent1"/>
+          </a:effectRef>
+          <a:fontRef idx="minor">
+            <a:schemeClr val="lt1"/>
+          </a:fontRef>
+        </p:style>
+        <p:txBody>
+          <a:bodyPr rtlCol="0" anchor="ctr"/>
+          <a:lstStyle/>
+          <a:p>
+            <a:pPr algn="ctr"/>
+            <a:endParaRPr lang="en-US"/>
+          </a:p>
+        </p:txBody>
+      </p:sp>
+      <p:sp>
+        <p:nvSpPr>
+          <p:cNvPr id="12" name="TextBox 11"/>
+          <p:cNvSpPr txBox="1"/>
+          <p:nvPr/>
+        </p:nvSpPr>
+        <p:spPr>
+          <a:xfrm>
+            <a:off x="8424722" y="2285997"/>
+            <a:ext cx="3695114" cy="369332"/>
+          </a:xfrm>
+          <a:prstGeom prst="rect">
+            <a:avLst/>
+          </a:prstGeom>
+          <a:noFill/>
+        </p:spPr>
+        <p:txBody>
+          <a:bodyPr wrap="none" rtlCol="0">
+            <a:spAutoFit/>
+          </a:bodyPr>
+          <a:lstStyle/>
+          <a:p>
+            <a:r>
+              <a:rPr lang="en-US" dirty="0" err="1" smtClean="0"/>
+              <a:t>KeyName</a:t>
+            </a:r>
+            <a:r>
+              <a:rPr lang="en-US" dirty="0" smtClean="0"/>
+              <a:t>, epoch, type, value, ACL list</a:t>
+            </a:r>
+            <a:endParaRPr lang="en-US" dirty="0"/>
+          </a:p>
+        </p:txBody>
+      </p:sp>
+      <p:sp>
+        <p:nvSpPr>
+          <p:cNvPr id="35" name="TextBox 34"/>
+          <p:cNvSpPr txBox="1"/>
+          <p:nvPr/>
+        </p:nvSpPr>
+        <p:spPr>
+          <a:xfrm>
+            <a:off x="8979903" y="3045159"/>
+            <a:ext cx="3136500" cy="338554"/>
+          </a:xfrm>
+          <a:prstGeom prst="rect">
+            <a:avLst/>
+          </a:prstGeom>
+          <a:noFill/>
+        </p:spPr>
+        <p:txBody>
+          <a:bodyPr wrap="none" rtlCol="0">
+            <a:spAutoFit/>
+          </a:bodyPr>
+          <a:lstStyle/>
+          <a:p>
+            <a:r>
+              <a:rPr lang="en-US" sz="1600" dirty="0" smtClean="0"/>
+              <a:t>Program Principal name, </a:t>
+            </a:r>
+            <a:r>
+              <a:rPr lang="en-US" sz="1600" dirty="0" err="1" smtClean="0"/>
+              <a:t>read,write</a:t>
+            </a:r>
+            <a:endParaRPr lang="en-US" sz="1600" dirty="0"/>
+          </a:p>
+        </p:txBody>
+      </p:sp>
+      <p:sp>
+        <p:nvSpPr>
+          <p:cNvPr id="37" name="TextBox 36"/>
+          <p:cNvSpPr txBox="1"/>
+          <p:nvPr/>
+        </p:nvSpPr>
+        <p:spPr>
+          <a:xfrm>
+            <a:off x="8985342" y="3703746"/>
+            <a:ext cx="3136500" cy="338554"/>
+          </a:xfrm>
+          <a:prstGeom prst="rect">
+            <a:avLst/>
+          </a:prstGeom>
+          <a:noFill/>
+        </p:spPr>
+        <p:txBody>
+          <a:bodyPr wrap="none" rtlCol="0">
+            <a:spAutoFit/>
+          </a:bodyPr>
+          <a:lstStyle/>
+          <a:p>
+            <a:r>
+              <a:rPr lang="en-US" sz="1600" dirty="0" smtClean="0"/>
+              <a:t>Program Principal name, </a:t>
+            </a:r>
+            <a:r>
+              <a:rPr lang="en-US" sz="1600" dirty="0" err="1" smtClean="0"/>
+              <a:t>read,write</a:t>
+            </a:r>
+            <a:endParaRPr lang="en-US" sz="1600" dirty="0"/>
+          </a:p>
+        </p:txBody>
+      </p:sp>
+      <p:sp>
+        <p:nvSpPr>
+          <p:cNvPr id="39" name="TextBox 38"/>
+          <p:cNvSpPr txBox="1"/>
+          <p:nvPr/>
+        </p:nvSpPr>
+        <p:spPr>
+          <a:xfrm>
+            <a:off x="9083316" y="5189652"/>
+            <a:ext cx="3136500" cy="338554"/>
+          </a:xfrm>
+          <a:prstGeom prst="rect">
+            <a:avLst/>
+          </a:prstGeom>
+          <a:noFill/>
+        </p:spPr>
+        <p:txBody>
+          <a:bodyPr wrap="none" rtlCol="0">
+            <a:spAutoFit/>
+          </a:bodyPr>
+          <a:lstStyle/>
+          <a:p>
+            <a:r>
+              <a:rPr lang="en-US" sz="1600" dirty="0" smtClean="0"/>
+              <a:t>Program Principal name, </a:t>
+            </a:r>
+            <a:r>
+              <a:rPr lang="en-US" sz="1600" dirty="0" err="1" smtClean="0"/>
+              <a:t>read,write</a:t>
+            </a:r>
+            <a:endParaRPr lang="en-US" sz="1600" dirty="0"/>
+          </a:p>
+        </p:txBody>
+      </p:sp>
+      <p:cxnSp>
+        <p:nvCxnSpPr>
+          <p:cNvPr id="41" name="Straight Arrow Connector 40"/>
+          <p:cNvCxnSpPr/>
+          <p:nvPr/>
+        </p:nvCxnSpPr>
+        <p:spPr>
+          <a:xfrm>
+            <a:off x="10264016" y="2619318"/>
+            <a:ext cx="0" cy="425841"/>
+          </a:xfrm>
+          <a:prstGeom prst="straightConnector1">
+            <a:avLst/>
+          </a:prstGeom>
+          <a:ln w="34925">
+            <a:solidFill>
+              <a:schemeClr val="accent6"/>
+            </a:solidFill>
+            <a:tailEnd type="triangle"/>
+          </a:ln>
+        </p:spPr>
+        <p:style>
+          <a:lnRef idx="1">
+            <a:schemeClr val="accent1"/>
+          </a:lnRef>
+          <a:fillRef idx="0">
+            <a:schemeClr val="accent1"/>
+          </a:fillRef>
+          <a:effectRef idx="0">
+            <a:schemeClr val="accent1"/>
+          </a:effectRef>
+          <a:fontRef idx="minor">
+            <a:schemeClr val="tx1"/>
+          </a:fontRef>
+        </p:style>
+      </p:cxnSp>
+      <p:cxnSp>
+        <p:nvCxnSpPr>
+          <p:cNvPr id="43" name="Straight Arrow Connector 42"/>
+          <p:cNvCxnSpPr/>
+          <p:nvPr/>
+        </p:nvCxnSpPr>
+        <p:spPr>
+          <a:xfrm>
+            <a:off x="10302113" y="3310565"/>
+            <a:ext cx="0" cy="425841"/>
+          </a:xfrm>
+          <a:prstGeom prst="straightConnector1">
+            <a:avLst/>
+          </a:prstGeom>
+          <a:ln w="34925">
+            <a:solidFill>
+              <a:schemeClr val="accent6"/>
+            </a:solidFill>
+            <a:tailEnd type="triangle"/>
+          </a:ln>
+        </p:spPr>
+        <p:style>
+          <a:lnRef idx="1">
+            <a:schemeClr val="accent1"/>
+          </a:lnRef>
+          <a:fillRef idx="0">
+            <a:schemeClr val="accent1"/>
+          </a:fillRef>
+          <a:effectRef idx="0">
+            <a:schemeClr val="accent1"/>
+          </a:effectRef>
+          <a:fontRef idx="minor">
+            <a:schemeClr val="tx1"/>
+          </a:fontRef>
+        </p:style>
+      </p:cxnSp>
+      <p:cxnSp>
+        <p:nvCxnSpPr>
+          <p:cNvPr id="46" name="Straight Arrow Connector 45"/>
+          <p:cNvCxnSpPr/>
+          <p:nvPr/>
+        </p:nvCxnSpPr>
+        <p:spPr>
+          <a:xfrm>
+            <a:off x="10302113" y="4045347"/>
+            <a:ext cx="0" cy="425841"/>
+          </a:xfrm>
+          <a:prstGeom prst="straightConnector1">
+            <a:avLst/>
+          </a:prstGeom>
+          <a:ln w="34925">
+            <a:solidFill>
+              <a:schemeClr val="accent6"/>
+            </a:solidFill>
+            <a:tailEnd type="triangle"/>
+          </a:ln>
+        </p:spPr>
+        <p:style>
+          <a:lnRef idx="1">
+            <a:schemeClr val="accent1"/>
+          </a:lnRef>
+          <a:fillRef idx="0">
+            <a:schemeClr val="accent1"/>
+          </a:fillRef>
+          <a:effectRef idx="0">
+            <a:schemeClr val="accent1"/>
+          </a:effectRef>
+          <a:fontRef idx="minor">
+            <a:schemeClr val="tx1"/>
+          </a:fontRef>
+        </p:style>
+      </p:cxnSp>
+      <p:cxnSp>
+        <p:nvCxnSpPr>
+          <p:cNvPr id="48" name="Straight Arrow Connector 47"/>
+          <p:cNvCxnSpPr/>
+          <p:nvPr/>
+        </p:nvCxnSpPr>
+        <p:spPr>
+          <a:xfrm>
+            <a:off x="10307555" y="4850893"/>
+            <a:ext cx="0" cy="425841"/>
+          </a:xfrm>
+          <a:prstGeom prst="straightConnector1">
+            <a:avLst/>
+          </a:prstGeom>
+          <a:ln w="34925">
+            <a:solidFill>
+              <a:schemeClr val="accent6"/>
+            </a:solidFill>
+            <a:tailEnd type="triangle"/>
+          </a:ln>
+        </p:spPr>
+        <p:style>
+          <a:lnRef idx="1">
+            <a:schemeClr val="accent1"/>
+          </a:lnRef>
+          <a:fillRef idx="0">
+            <a:schemeClr val="accent1"/>
+          </a:fillRef>
+          <a:effectRef idx="0">
+            <a:schemeClr val="accent1"/>
+          </a:effectRef>
+          <a:fontRef idx="minor">
+            <a:schemeClr val="tx1"/>
+          </a:fontRef>
+        </p:style>
+      </p:cxnSp>
+      <p:sp>
+        <p:nvSpPr>
+          <p:cNvPr id="51" name="TextBox 50"/>
+          <p:cNvSpPr txBox="1"/>
+          <p:nvPr/>
+        </p:nvSpPr>
+        <p:spPr>
+          <a:xfrm>
+            <a:off x="10166442" y="4492962"/>
+            <a:ext cx="338554" cy="338554"/>
+          </a:xfrm>
+          <a:prstGeom prst="rect">
+            <a:avLst/>
+          </a:prstGeom>
+          <a:noFill/>
+        </p:spPr>
+        <p:txBody>
+          <a:bodyPr wrap="none" rtlCol="0">
+            <a:spAutoFit/>
+          </a:bodyPr>
+          <a:lstStyle/>
+          <a:p>
+            <a:r>
+              <a:rPr lang="is-IS" sz="1600" smtClean="0"/>
+              <a:t>…</a:t>
+            </a:r>
+            <a:endParaRPr lang="en-US" sz="1600" dirty="0"/>
+          </a:p>
+        </p:txBody>
+      </p:sp>
+      <p:sp>
+        <p:nvSpPr>
+          <p:cNvPr id="52" name="TextBox 51"/>
+          <p:cNvSpPr txBox="1"/>
+          <p:nvPr/>
+        </p:nvSpPr>
+        <p:spPr>
+          <a:xfrm>
+            <a:off x="2803264" y="1124212"/>
+            <a:ext cx="288862" cy="338554"/>
+          </a:xfrm>
+          <a:prstGeom prst="rect">
+            <a:avLst/>
+          </a:prstGeom>
+          <a:noFill/>
+        </p:spPr>
+        <p:txBody>
+          <a:bodyPr wrap="none" rtlCol="0">
+            <a:spAutoFit/>
+          </a:bodyPr>
+          <a:lstStyle/>
+          <a:p>
+            <a:r>
+              <a:rPr lang="en-US" sz="1600" dirty="0" smtClean="0"/>
+              <a:t>6</a:t>
+            </a:r>
+            <a:endParaRPr lang="en-US" sz="1600" dirty="0"/>
+          </a:p>
+        </p:txBody>
+      </p:sp>
+      <p:cxnSp>
+        <p:nvCxnSpPr>
+          <p:cNvPr id="53" name="Straight Arrow Connector 52"/>
+          <p:cNvCxnSpPr/>
+          <p:nvPr/>
+        </p:nvCxnSpPr>
+        <p:spPr>
+          <a:xfrm>
+            <a:off x="3027726" y="457236"/>
+            <a:ext cx="2464676" cy="0"/>
+          </a:xfrm>
+          <a:prstGeom prst="straightConnector1">
+            <a:avLst/>
+          </a:prstGeom>
+          <a:ln w="31750">
+            <a:tailEnd type="triangle"/>
+          </a:ln>
+        </p:spPr>
+        <p:style>
+          <a:lnRef idx="1">
+            <a:schemeClr val="accent1"/>
+          </a:lnRef>
+          <a:fillRef idx="0">
+            <a:schemeClr val="accent1"/>
+          </a:fillRef>
+          <a:effectRef idx="0">
+            <a:schemeClr val="accent1"/>
+          </a:effectRef>
+          <a:fontRef idx="minor">
+            <a:schemeClr val="tx1"/>
+          </a:fontRef>
+        </p:style>
+      </p:cxnSp>
+      <p:sp>
+        <p:nvSpPr>
+          <p:cNvPr id="54" name="TextBox 53"/>
+          <p:cNvSpPr txBox="1"/>
+          <p:nvPr/>
+        </p:nvSpPr>
+        <p:spPr>
+          <a:xfrm flipH="1">
+            <a:off x="3941580" y="117499"/>
+            <a:ext cx="435487" cy="338554"/>
+          </a:xfrm>
+          <a:prstGeom prst="rect">
+            <a:avLst/>
+          </a:prstGeom>
+          <a:noFill/>
+        </p:spPr>
+        <p:txBody>
+          <a:bodyPr wrap="square" rtlCol="0">
+            <a:spAutoFit/>
+          </a:bodyPr>
+          <a:lstStyle/>
+          <a:p>
+            <a:r>
+              <a:rPr lang="en-US" sz="1600" dirty="0" smtClean="0"/>
+              <a:t>1</a:t>
+            </a:r>
+            <a:endParaRPr lang="en-US" sz="1600" dirty="0"/>
+          </a:p>
+        </p:txBody>
+      </p:sp>
+    </p:spTree>
+    <p:extLst>
+      <p:ext uri="{BB962C8B-B14F-4D97-AF65-F5344CB8AC3E}">
+        <p14:creationId xmlns:p14="http://schemas.microsoft.com/office/powerpoint/2010/main" val="1566806753"/>
+      </p:ext>
+    </p:extLst>
+  </p:cSld>
+  <p:clrMapOvr>
+    <a:masterClrMapping/>
+  </p:clrMapOvr>
+</p:sld>
+</file>
+
+<file path=ppt/slides/slide4.xml><?xml version="1.0" encoding="utf-8"?>
+<p:sld xmlns:a="http://schemas.openxmlformats.org/drawingml/2006/main" xmlns:r="http://schemas.openxmlformats.org/officeDocument/2006/relationships" xmlns:p="http://schemas.openxmlformats.org/presentationml/2006/main">
+  <p:cSld>
+    <p:spTree>
+      <p:nvGrpSpPr>
+        <p:cNvPr id="1" name=""/>
+        <p:cNvGrpSpPr/>
+        <p:nvPr/>
+      </p:nvGrpSpPr>
+      <p:grpSpPr>
+        <a:xfrm>
+          <a:off x="0" y="0"/>
+          <a:ext cx="0" cy="0"/>
+          <a:chOff x="0" y="0"/>
+          <a:chExt cx="0" cy="0"/>
+        </a:xfrm>
+      </p:grpSpPr>
+      <p:sp>
+        <p:nvSpPr>
+          <p:cNvPr id="4" name="Rectangle 3"/>
+          <p:cNvSpPr/>
+          <p:nvPr/>
+        </p:nvSpPr>
+        <p:spPr>
+          <a:xfrm>
+            <a:off x="646386" y="1732072"/>
+            <a:ext cx="2648607" cy="596094"/>
+          </a:xfrm>
+          <a:prstGeom prst="rect">
+            <a:avLst/>
+          </a:prstGeom>
+          <a:noFill/>
+          <a:ln w="31750"/>
+        </p:spPr>
+        <p:style>
+          <a:lnRef idx="2">
+            <a:schemeClr val="accent1">
+              <a:shade val="50000"/>
+            </a:schemeClr>
+          </a:lnRef>
+          <a:fillRef idx="1">
+            <a:schemeClr val="accent1"/>
+          </a:fillRef>
+          <a:effectRef idx="0">
+            <a:schemeClr val="accent1"/>
+          </a:effectRef>
+          <a:fontRef idx="minor">
+            <a:schemeClr val="lt1"/>
+          </a:fontRef>
+        </p:style>
+        <p:txBody>
+          <a:bodyPr rtlCol="0" anchor="ctr"/>
+          <a:lstStyle/>
+          <a:p>
+            <a:pPr algn="ctr"/>
+            <a:endParaRPr lang="en-US"/>
+          </a:p>
+        </p:txBody>
+      </p:sp>
+      <p:sp>
+        <p:nvSpPr>
+          <p:cNvPr id="5" name="TextBox 4"/>
+          <p:cNvSpPr txBox="1"/>
+          <p:nvPr/>
+        </p:nvSpPr>
+        <p:spPr>
+          <a:xfrm>
+            <a:off x="1346577" y="1852781"/>
+            <a:ext cx="1589749" cy="369332"/>
+          </a:xfrm>
+          <a:prstGeom prst="rect">
+            <a:avLst/>
+          </a:prstGeom>
+          <a:noFill/>
+        </p:spPr>
+        <p:txBody>
+          <a:bodyPr wrap="square" rtlCol="0">
+            <a:spAutoFit/>
+          </a:bodyPr>
+          <a:lstStyle/>
+          <a:p>
+            <a:r>
+              <a:rPr lang="en-US" dirty="0" smtClean="0"/>
+              <a:t>Host System</a:t>
+            </a:r>
+            <a:endParaRPr lang="en-US" dirty="0"/>
+          </a:p>
+        </p:txBody>
+      </p:sp>
+      <p:sp>
+        <p:nvSpPr>
+          <p:cNvPr id="6" name="Rectangle 5"/>
+          <p:cNvSpPr/>
+          <p:nvPr/>
+        </p:nvSpPr>
+        <p:spPr>
+          <a:xfrm>
+            <a:off x="841571" y="350642"/>
+            <a:ext cx="2153174" cy="783589"/>
+          </a:xfrm>
+          <a:prstGeom prst="rect">
+            <a:avLst/>
+          </a:prstGeom>
+          <a:noFill/>
+          <a:ln w="31750"/>
+        </p:spPr>
+        <p:style>
+          <a:lnRef idx="2">
+            <a:schemeClr val="accent1">
+              <a:shade val="50000"/>
+            </a:schemeClr>
+          </a:lnRef>
+          <a:fillRef idx="1">
+            <a:schemeClr val="accent1"/>
+          </a:fillRef>
+          <a:effectRef idx="0">
+            <a:schemeClr val="accent1"/>
+          </a:effectRef>
+          <a:fontRef idx="minor">
+            <a:schemeClr val="lt1"/>
+          </a:fontRef>
+        </p:style>
+        <p:txBody>
+          <a:bodyPr rtlCol="0" anchor="ctr"/>
+          <a:lstStyle/>
+          <a:p>
+            <a:pPr algn="ctr"/>
+            <a:endParaRPr lang="en-US"/>
+          </a:p>
+        </p:txBody>
+      </p:sp>
+      <p:sp>
+        <p:nvSpPr>
+          <p:cNvPr id="7" name="TextBox 6"/>
+          <p:cNvSpPr txBox="1"/>
+          <p:nvPr/>
+        </p:nvSpPr>
+        <p:spPr>
+          <a:xfrm>
+            <a:off x="1102621" y="495964"/>
+            <a:ext cx="2192373" cy="646331"/>
+          </a:xfrm>
+          <a:prstGeom prst="rect">
+            <a:avLst/>
+          </a:prstGeom>
+          <a:noFill/>
+        </p:spPr>
+        <p:txBody>
+          <a:bodyPr wrap="square" rtlCol="0">
+            <a:spAutoFit/>
+          </a:bodyPr>
+          <a:lstStyle/>
+          <a:p>
+            <a:r>
+              <a:rPr lang="en-US" dirty="0" err="1"/>
+              <a:t>s</a:t>
+            </a:r>
+            <a:r>
+              <a:rPr lang="en-US" dirty="0" err="1" smtClean="0"/>
+              <a:t>impleclient</a:t>
+            </a:r>
+            <a:r>
+              <a:rPr lang="en-US" dirty="0" smtClean="0"/>
+              <a:t> </a:t>
+            </a:r>
+            <a:endParaRPr lang="en-US" dirty="0" smtClean="0"/>
+          </a:p>
+          <a:p>
+            <a:r>
+              <a:rPr lang="en-US" dirty="0" smtClean="0"/>
+              <a:t>Version 2</a:t>
+            </a:r>
+            <a:endParaRPr lang="en-US" dirty="0"/>
+          </a:p>
+        </p:txBody>
+      </p:sp>
+      <p:sp>
+        <p:nvSpPr>
+          <p:cNvPr id="10" name="Rectangle 9"/>
+          <p:cNvSpPr/>
+          <p:nvPr/>
+        </p:nvSpPr>
+        <p:spPr>
+          <a:xfrm>
+            <a:off x="5481150" y="353542"/>
+            <a:ext cx="2568836" cy="1020663"/>
+          </a:xfrm>
+          <a:prstGeom prst="rect">
+            <a:avLst/>
+          </a:prstGeom>
+          <a:noFill/>
+          <a:ln w="31750"/>
+        </p:spPr>
+        <p:style>
+          <a:lnRef idx="2">
+            <a:schemeClr val="accent1">
+              <a:shade val="50000"/>
+            </a:schemeClr>
+          </a:lnRef>
+          <a:fillRef idx="1">
+            <a:schemeClr val="accent1"/>
+          </a:fillRef>
+          <a:effectRef idx="0">
+            <a:schemeClr val="accent1"/>
+          </a:effectRef>
+          <a:fontRef idx="minor">
+            <a:schemeClr val="lt1"/>
+          </a:fontRef>
+        </p:style>
+        <p:txBody>
+          <a:bodyPr rtlCol="0" anchor="ctr"/>
+          <a:lstStyle/>
+          <a:p>
+            <a:pPr algn="ctr"/>
+            <a:endParaRPr lang="en-US"/>
+          </a:p>
+        </p:txBody>
+      </p:sp>
+      <p:cxnSp>
+        <p:nvCxnSpPr>
+          <p:cNvPr id="21" name="Straight Arrow Connector 20"/>
+          <p:cNvCxnSpPr/>
+          <p:nvPr/>
+        </p:nvCxnSpPr>
+        <p:spPr>
+          <a:xfrm>
+            <a:off x="1555429" y="1153993"/>
+            <a:ext cx="0" cy="578078"/>
+          </a:xfrm>
+          <a:prstGeom prst="straightConnector1">
+            <a:avLst/>
+          </a:prstGeom>
+          <a:ln w="34925">
+            <a:tailEnd type="triangle"/>
+          </a:ln>
+        </p:spPr>
+        <p:style>
+          <a:lnRef idx="1">
+            <a:schemeClr val="accent1"/>
+          </a:lnRef>
+          <a:fillRef idx="0">
+            <a:schemeClr val="accent1"/>
+          </a:fillRef>
+          <a:effectRef idx="0">
+            <a:schemeClr val="accent1"/>
+          </a:effectRef>
+          <a:fontRef idx="minor">
+            <a:schemeClr val="tx1"/>
+          </a:fontRef>
+        </p:style>
+      </p:cxnSp>
+      <p:cxnSp>
+        <p:nvCxnSpPr>
+          <p:cNvPr id="22" name="Straight Arrow Connector 21"/>
+          <p:cNvCxnSpPr/>
+          <p:nvPr/>
+        </p:nvCxnSpPr>
+        <p:spPr>
+          <a:xfrm>
+            <a:off x="1970317" y="1148733"/>
+            <a:ext cx="0" cy="578078"/>
+          </a:xfrm>
+          <a:prstGeom prst="straightConnector1">
+            <a:avLst/>
+          </a:prstGeom>
+          <a:ln w="34925">
+            <a:headEnd type="triangle"/>
+            <a:tailEnd type="none" w="med" len="med"/>
+          </a:ln>
+        </p:spPr>
+        <p:style>
+          <a:lnRef idx="1">
+            <a:schemeClr val="accent1"/>
+          </a:lnRef>
+          <a:fillRef idx="0">
+            <a:schemeClr val="accent1"/>
+          </a:fillRef>
+          <a:effectRef idx="0">
+            <a:schemeClr val="accent1"/>
+          </a:effectRef>
+          <a:fontRef idx="minor">
+            <a:schemeClr val="tx1"/>
+          </a:fontRef>
+        </p:style>
+      </p:cxnSp>
+      <p:sp>
+        <p:nvSpPr>
+          <p:cNvPr id="23" name="TextBox 22"/>
+          <p:cNvSpPr txBox="1"/>
+          <p:nvPr/>
+        </p:nvSpPr>
+        <p:spPr>
+          <a:xfrm>
+            <a:off x="1161393" y="1264346"/>
+            <a:ext cx="288862" cy="338554"/>
+          </a:xfrm>
+          <a:prstGeom prst="rect">
+            <a:avLst/>
+          </a:prstGeom>
+          <a:noFill/>
+        </p:spPr>
+        <p:txBody>
+          <a:bodyPr wrap="none" rtlCol="0">
+            <a:spAutoFit/>
+          </a:bodyPr>
+          <a:lstStyle/>
+          <a:p>
+            <a:r>
+              <a:rPr lang="en-US" sz="1600" dirty="0" smtClean="0"/>
+              <a:t>3</a:t>
+            </a:r>
+            <a:endParaRPr lang="en-US" sz="1600" dirty="0"/>
+          </a:p>
+        </p:txBody>
+      </p:sp>
+      <p:sp>
+        <p:nvSpPr>
+          <p:cNvPr id="38" name="TextBox 37"/>
+          <p:cNvSpPr txBox="1"/>
+          <p:nvPr/>
+        </p:nvSpPr>
+        <p:spPr>
+          <a:xfrm>
+            <a:off x="4597353" y="6327704"/>
+            <a:ext cx="2372957" cy="400110"/>
+          </a:xfrm>
+          <a:prstGeom prst="rect">
+            <a:avLst/>
+          </a:prstGeom>
+          <a:noFill/>
+        </p:spPr>
+        <p:txBody>
+          <a:bodyPr wrap="none" rtlCol="0">
+            <a:spAutoFit/>
+          </a:bodyPr>
+          <a:lstStyle/>
+          <a:p>
+            <a:r>
+              <a:rPr lang="en-US" sz="2000" b="1" dirty="0" smtClean="0"/>
+              <a:t>Getting content keys</a:t>
+            </a:r>
+            <a:endParaRPr lang="en-US" b="1" dirty="0"/>
+          </a:p>
+        </p:txBody>
+      </p:sp>
+      <p:sp>
+        <p:nvSpPr>
+          <p:cNvPr id="40" name="TextBox 39"/>
+          <p:cNvSpPr txBox="1"/>
+          <p:nvPr/>
+        </p:nvSpPr>
+        <p:spPr>
+          <a:xfrm>
+            <a:off x="1671148" y="1259086"/>
+            <a:ext cx="288862" cy="338554"/>
+          </a:xfrm>
+          <a:prstGeom prst="rect">
+            <a:avLst/>
+          </a:prstGeom>
+          <a:noFill/>
+        </p:spPr>
+        <p:txBody>
+          <a:bodyPr wrap="none" rtlCol="0">
+            <a:spAutoFit/>
+          </a:bodyPr>
+          <a:lstStyle/>
+          <a:p>
+            <a:r>
+              <a:rPr lang="en-US" sz="1600" dirty="0" smtClean="0"/>
+              <a:t>4</a:t>
+            </a:r>
+            <a:endParaRPr lang="en-US" sz="1600" dirty="0"/>
+          </a:p>
+        </p:txBody>
+      </p:sp>
+      <p:cxnSp>
+        <p:nvCxnSpPr>
+          <p:cNvPr id="42" name="Straight Arrow Connector 41"/>
+          <p:cNvCxnSpPr/>
+          <p:nvPr/>
+        </p:nvCxnSpPr>
+        <p:spPr>
+          <a:xfrm>
+            <a:off x="3005958" y="696724"/>
+            <a:ext cx="2464676" cy="0"/>
+          </a:xfrm>
+          <a:prstGeom prst="straightConnector1">
+            <a:avLst/>
+          </a:prstGeom>
+          <a:ln w="31750">
+            <a:tailEnd type="triangle"/>
+          </a:ln>
+        </p:spPr>
+        <p:style>
+          <a:lnRef idx="1">
+            <a:schemeClr val="accent1"/>
+          </a:lnRef>
+          <a:fillRef idx="0">
+            <a:schemeClr val="accent1"/>
+          </a:fillRef>
+          <a:effectRef idx="0">
+            <a:schemeClr val="accent1"/>
+          </a:effectRef>
+          <a:fontRef idx="minor">
+            <a:schemeClr val="tx1"/>
+          </a:fontRef>
+        </p:style>
+      </p:cxnSp>
+      <p:cxnSp>
+        <p:nvCxnSpPr>
+          <p:cNvPr id="44" name="Straight Arrow Connector 43"/>
+          <p:cNvCxnSpPr/>
+          <p:nvPr/>
+        </p:nvCxnSpPr>
+        <p:spPr>
+          <a:xfrm>
+            <a:off x="3016464" y="895042"/>
+            <a:ext cx="2464676" cy="0"/>
+          </a:xfrm>
+          <a:prstGeom prst="straightConnector1">
+            <a:avLst/>
+          </a:prstGeom>
+          <a:ln w="31750">
+            <a:headEnd type="triangle" w="med" len="med"/>
+            <a:tailEnd type="none"/>
+          </a:ln>
+        </p:spPr>
+        <p:style>
+          <a:lnRef idx="1">
+            <a:schemeClr val="accent1"/>
+          </a:lnRef>
+          <a:fillRef idx="0">
+            <a:schemeClr val="accent1"/>
+          </a:fillRef>
+          <a:effectRef idx="0">
+            <a:schemeClr val="accent1"/>
+          </a:effectRef>
+          <a:fontRef idx="minor">
+            <a:schemeClr val="tx1"/>
+          </a:fontRef>
+        </p:style>
+      </p:cxnSp>
+      <p:cxnSp>
+        <p:nvCxnSpPr>
+          <p:cNvPr id="45" name="Straight Arrow Connector 44"/>
+          <p:cNvCxnSpPr/>
+          <p:nvPr/>
+        </p:nvCxnSpPr>
+        <p:spPr>
+          <a:xfrm>
+            <a:off x="2894893" y="1139109"/>
+            <a:ext cx="605052" cy="396976"/>
+          </a:xfrm>
+          <a:prstGeom prst="straightConnector1">
+            <a:avLst/>
+          </a:prstGeom>
+          <a:ln w="34925">
+            <a:tailEnd type="triangle"/>
+          </a:ln>
+        </p:spPr>
+        <p:style>
+          <a:lnRef idx="1">
+            <a:schemeClr val="accent1"/>
+          </a:lnRef>
+          <a:fillRef idx="0">
+            <a:schemeClr val="accent1"/>
+          </a:fillRef>
+          <a:effectRef idx="0">
+            <a:schemeClr val="accent1"/>
+          </a:effectRef>
+          <a:fontRef idx="minor">
+            <a:schemeClr val="tx1"/>
+          </a:fontRef>
+        </p:style>
+      </p:cxnSp>
+      <p:sp>
+        <p:nvSpPr>
+          <p:cNvPr id="47" name="Can 46"/>
+          <p:cNvSpPr/>
+          <p:nvPr/>
+        </p:nvSpPr>
+        <p:spPr>
+          <a:xfrm>
+            <a:off x="3515704" y="1385225"/>
+            <a:ext cx="867103" cy="709449"/>
+          </a:xfrm>
+          <a:prstGeom prst="can">
+            <a:avLst/>
+          </a:prstGeom>
+          <a:noFill/>
+          <a:ln w="31750"/>
+        </p:spPr>
+        <p:style>
+          <a:lnRef idx="2">
+            <a:schemeClr val="accent1">
+              <a:shade val="50000"/>
+            </a:schemeClr>
+          </a:lnRef>
+          <a:fillRef idx="1">
+            <a:schemeClr val="accent1"/>
+          </a:fillRef>
+          <a:effectRef idx="0">
+            <a:schemeClr val="accent1"/>
+          </a:effectRef>
+          <a:fontRef idx="minor">
+            <a:schemeClr val="lt1"/>
+          </a:fontRef>
+        </p:style>
+        <p:txBody>
+          <a:bodyPr rtlCol="0" anchor="ctr"/>
+          <a:lstStyle/>
+          <a:p>
+            <a:pPr algn="ctr"/>
+            <a:endParaRPr lang="en-US"/>
+          </a:p>
+        </p:txBody>
+      </p:sp>
+      <p:sp>
+        <p:nvSpPr>
+          <p:cNvPr id="49" name="TextBox 48"/>
+          <p:cNvSpPr txBox="1"/>
+          <p:nvPr/>
+        </p:nvSpPr>
+        <p:spPr>
+          <a:xfrm flipH="1">
+            <a:off x="4828395" y="900823"/>
+            <a:ext cx="435487" cy="338554"/>
+          </a:xfrm>
+          <a:prstGeom prst="rect">
+            <a:avLst/>
+          </a:prstGeom>
+          <a:noFill/>
+        </p:spPr>
+        <p:txBody>
+          <a:bodyPr wrap="square" rtlCol="0">
+            <a:spAutoFit/>
+          </a:bodyPr>
+          <a:lstStyle/>
+          <a:p>
+            <a:r>
+              <a:rPr lang="en-US" sz="1600" dirty="0" smtClean="0"/>
+              <a:t>3</a:t>
+            </a:r>
+            <a:endParaRPr lang="en-US" sz="1600" dirty="0"/>
+          </a:p>
+        </p:txBody>
+      </p:sp>
+      <p:sp>
+        <p:nvSpPr>
+          <p:cNvPr id="58" name="TextBox 57"/>
+          <p:cNvSpPr txBox="1"/>
+          <p:nvPr/>
+        </p:nvSpPr>
+        <p:spPr>
+          <a:xfrm>
+            <a:off x="432048" y="2560467"/>
+            <a:ext cx="7648197" cy="3600986"/>
+          </a:xfrm>
+          <a:prstGeom prst="rect">
+            <a:avLst/>
+          </a:prstGeom>
+          <a:noFill/>
+        </p:spPr>
+        <p:txBody>
+          <a:bodyPr wrap="square" rtlCol="0">
+            <a:spAutoFit/>
+          </a:bodyPr>
+          <a:lstStyle/>
+          <a:p>
+            <a:r>
+              <a:rPr lang="en-US" b="1" dirty="0" smtClean="0"/>
+              <a:t>To get symmetric keys protecting stored data from another program or version</a:t>
+            </a:r>
+            <a:endParaRPr lang="en-US" b="1" dirty="0" smtClean="0"/>
+          </a:p>
+          <a:p>
+            <a:pPr marL="342900" indent="-342900">
+              <a:buFont typeface="+mj-lt"/>
+              <a:buAutoNum type="arabicPeriod"/>
+            </a:pPr>
+            <a:r>
+              <a:rPr lang="en-US" dirty="0" err="1" smtClean="0"/>
+              <a:t>Si</a:t>
+            </a:r>
+            <a:r>
+              <a:rPr lang="en-US" dirty="0" err="1" smtClean="0"/>
+              <a:t>mpleclient</a:t>
+            </a:r>
+            <a:r>
+              <a:rPr lang="en-US" dirty="0" smtClean="0"/>
+              <a:t>, version 2 retrieves program private key and opens Tao Channel </a:t>
+            </a:r>
+            <a:r>
+              <a:rPr lang="en-US" dirty="0"/>
+              <a:t>to </a:t>
+            </a:r>
+            <a:r>
+              <a:rPr lang="en-US" dirty="0" err="1"/>
+              <a:t>Simpleclient</a:t>
+            </a:r>
+            <a:r>
+              <a:rPr lang="en-US" dirty="0"/>
+              <a:t>, version 2</a:t>
+            </a:r>
+            <a:r>
+              <a:rPr lang="en-US" dirty="0" smtClean="0"/>
+              <a:t>. </a:t>
+            </a:r>
+            <a:r>
+              <a:rPr lang="en-US" dirty="0" err="1"/>
+              <a:t>Simpleclient</a:t>
+            </a:r>
+            <a:r>
+              <a:rPr lang="en-US" dirty="0"/>
+              <a:t>, version 2 </a:t>
+            </a:r>
+            <a:r>
+              <a:rPr lang="en-US" dirty="0" smtClean="0"/>
+              <a:t>and </a:t>
+            </a:r>
+            <a:r>
+              <a:rPr lang="en-US" dirty="0" err="1" smtClean="0"/>
+              <a:t>Simpleclient</a:t>
+            </a:r>
+            <a:r>
+              <a:rPr lang="en-US" dirty="0" smtClean="0"/>
+              <a:t>, version 1 use Program Certificates and policy public key to open authenticated, encrypted, integrity protected channel.</a:t>
+            </a:r>
+            <a:endParaRPr lang="en-US" dirty="0" smtClean="0"/>
+          </a:p>
+          <a:p>
+            <a:pPr marL="342900" indent="-342900">
+              <a:buFont typeface="+mj-lt"/>
+              <a:buAutoNum type="arabicPeriod"/>
+            </a:pPr>
+            <a:r>
+              <a:rPr lang="en-US" dirty="0" smtClean="0"/>
+              <a:t>Simple service formats request for key disclosure naming (</a:t>
+            </a:r>
+            <a:r>
+              <a:rPr lang="en-US" dirty="0" err="1" smtClean="0"/>
+              <a:t>keyName</a:t>
+            </a:r>
+            <a:r>
+              <a:rPr lang="en-US" dirty="0" smtClean="0"/>
+              <a:t>, epoch) for keys it wants and sends request over Tao Channel </a:t>
+            </a:r>
+            <a:r>
+              <a:rPr lang="en-US" dirty="0"/>
+              <a:t>to </a:t>
+            </a:r>
+            <a:r>
+              <a:rPr lang="en-US" dirty="0" err="1" smtClean="0"/>
+              <a:t>CPSecretService</a:t>
+            </a:r>
+            <a:r>
+              <a:rPr lang="en-US" dirty="0" smtClean="0"/>
+              <a:t> accompanied with policy-key signed certificate stating </a:t>
+            </a:r>
+            <a:r>
+              <a:rPr lang="en-US" dirty="0" err="1" smtClean="0"/>
+              <a:t>policykey</a:t>
+            </a:r>
+            <a:r>
+              <a:rPr lang="en-US" dirty="0" smtClean="0"/>
+              <a:t> says </a:t>
+            </a:r>
+            <a:r>
+              <a:rPr lang="en-US" dirty="0" err="1" smtClean="0"/>
+              <a:t>ProgramPrincipalName</a:t>
+            </a:r>
+            <a:r>
+              <a:rPr lang="en-US" dirty="0" smtClean="0"/>
+              <a:t> (</a:t>
+            </a:r>
+            <a:r>
+              <a:rPr lang="en-US" dirty="0" err="1" smtClean="0"/>
+              <a:t>simpleclient</a:t>
+            </a:r>
+            <a:r>
+              <a:rPr lang="en-US" dirty="0" smtClean="0"/>
+              <a:t>, version 2) can read /</a:t>
+            </a:r>
+            <a:r>
+              <a:rPr lang="en-US" dirty="0" err="1" smtClean="0"/>
+              <a:t>jlm</a:t>
+            </a:r>
+            <a:r>
+              <a:rPr lang="en-US" dirty="0" smtClean="0"/>
+              <a:t>/zone-us/customer-folder-key, epoch 2.</a:t>
+            </a:r>
+          </a:p>
+          <a:p>
+            <a:pPr marL="342900" indent="-342900">
+              <a:buFont typeface="+mj-lt"/>
+              <a:buAutoNum type="arabicPeriod"/>
+            </a:pPr>
+            <a:r>
+              <a:rPr lang="en-US" dirty="0" err="1"/>
+              <a:t>Simpleclient</a:t>
+            </a:r>
+            <a:r>
+              <a:rPr lang="en-US" dirty="0"/>
+              <a:t>, version 1 </a:t>
+            </a:r>
+            <a:r>
+              <a:rPr lang="en-US" dirty="0" smtClean="0"/>
+              <a:t>transmits keys over </a:t>
+            </a:r>
+            <a:r>
+              <a:rPr lang="en-US" dirty="0" err="1" smtClean="0"/>
+              <a:t>tao</a:t>
+            </a:r>
+            <a:r>
+              <a:rPr lang="en-US" dirty="0" smtClean="0"/>
+              <a:t> channe</a:t>
+            </a:r>
+            <a:r>
+              <a:rPr lang="en-US" dirty="0"/>
+              <a:t>l</a:t>
+            </a:r>
+            <a:r>
+              <a:rPr lang="en-US" dirty="0" smtClean="0"/>
+              <a:t>.</a:t>
+            </a:r>
+          </a:p>
+          <a:p>
+            <a:pPr marL="342900" indent="-342900">
+              <a:buFont typeface="+mj-lt"/>
+              <a:buAutoNum type="arabicPeriod"/>
+            </a:pPr>
+            <a:r>
+              <a:rPr lang="en-US" dirty="0" smtClean="0"/>
+              <a:t>4, 5, 6, </a:t>
+            </a:r>
+            <a:r>
+              <a:rPr lang="en-US" dirty="0" err="1"/>
+              <a:t>Simpleclient</a:t>
+            </a:r>
+            <a:r>
+              <a:rPr lang="en-US" dirty="0"/>
+              <a:t>, version </a:t>
+            </a:r>
+            <a:r>
+              <a:rPr lang="en-US" dirty="0" smtClean="0"/>
+              <a:t>2 seals retrieved key </a:t>
+            </a:r>
+            <a:r>
+              <a:rPr lang="en-US" smtClean="0"/>
+              <a:t>for subsequent use.</a:t>
+            </a:r>
+            <a:endParaRPr lang="en-US" dirty="0" smtClean="0"/>
+          </a:p>
+          <a:p>
+            <a:pPr marL="342900" indent="-342900">
+              <a:buFont typeface="+mj-lt"/>
+              <a:buAutoNum type="arabicPeriod"/>
+            </a:pPr>
+            <a:endParaRPr lang="en-US" sz="1200" dirty="0"/>
+          </a:p>
+        </p:txBody>
+      </p:sp>
+      <p:sp>
+        <p:nvSpPr>
+          <p:cNvPr id="67" name="TextBox 66"/>
+          <p:cNvSpPr txBox="1"/>
+          <p:nvPr/>
+        </p:nvSpPr>
+        <p:spPr>
+          <a:xfrm flipH="1">
+            <a:off x="4377009" y="405972"/>
+            <a:ext cx="435487" cy="338554"/>
+          </a:xfrm>
+          <a:prstGeom prst="rect">
+            <a:avLst/>
+          </a:prstGeom>
+          <a:noFill/>
+        </p:spPr>
+        <p:txBody>
+          <a:bodyPr wrap="square" rtlCol="0">
+            <a:spAutoFit/>
+          </a:bodyPr>
+          <a:lstStyle/>
+          <a:p>
+            <a:r>
+              <a:rPr lang="en-US" sz="1600" dirty="0" smtClean="0"/>
+              <a:t>2</a:t>
+            </a:r>
+            <a:endParaRPr lang="en-US" sz="1600" dirty="0"/>
+          </a:p>
+        </p:txBody>
+      </p:sp>
+      <p:sp>
+        <p:nvSpPr>
+          <p:cNvPr id="52" name="TextBox 51"/>
+          <p:cNvSpPr txBox="1"/>
+          <p:nvPr/>
+        </p:nvSpPr>
+        <p:spPr>
+          <a:xfrm>
+            <a:off x="2803264" y="1248196"/>
+            <a:ext cx="288862" cy="338554"/>
+          </a:xfrm>
+          <a:prstGeom prst="rect">
+            <a:avLst/>
+          </a:prstGeom>
+          <a:noFill/>
+        </p:spPr>
+        <p:txBody>
+          <a:bodyPr wrap="none" rtlCol="0">
+            <a:spAutoFit/>
+          </a:bodyPr>
+          <a:lstStyle/>
+          <a:p>
+            <a:r>
+              <a:rPr lang="en-US" sz="1600" dirty="0" smtClean="0"/>
+              <a:t>5</a:t>
+            </a:r>
+            <a:endParaRPr lang="en-US" sz="1600" dirty="0"/>
+          </a:p>
+        </p:txBody>
+      </p:sp>
+      <p:sp>
+        <p:nvSpPr>
+          <p:cNvPr id="50" name="TextBox 49"/>
+          <p:cNvSpPr txBox="1"/>
+          <p:nvPr/>
+        </p:nvSpPr>
+        <p:spPr>
+          <a:xfrm>
+            <a:off x="5718532" y="524380"/>
+            <a:ext cx="2192373" cy="646331"/>
+          </a:xfrm>
+          <a:prstGeom prst="rect">
+            <a:avLst/>
+          </a:prstGeom>
+          <a:noFill/>
+        </p:spPr>
+        <p:txBody>
+          <a:bodyPr wrap="square" rtlCol="0">
+            <a:spAutoFit/>
+          </a:bodyPr>
+          <a:lstStyle/>
+          <a:p>
+            <a:r>
+              <a:rPr lang="en-US" dirty="0" err="1"/>
+              <a:t>s</a:t>
+            </a:r>
+            <a:r>
+              <a:rPr lang="en-US" dirty="0" err="1" smtClean="0"/>
+              <a:t>impleclient</a:t>
+            </a:r>
+            <a:r>
+              <a:rPr lang="en-US" dirty="0" smtClean="0"/>
+              <a:t> </a:t>
+            </a:r>
+            <a:endParaRPr lang="en-US" dirty="0" smtClean="0"/>
+          </a:p>
+          <a:p>
+            <a:r>
+              <a:rPr lang="en-US" dirty="0" smtClean="0"/>
+              <a:t>Version 1</a:t>
+            </a:r>
+            <a:endParaRPr lang="en-US" dirty="0"/>
+          </a:p>
+        </p:txBody>
+      </p:sp>
+      <p:cxnSp>
+        <p:nvCxnSpPr>
+          <p:cNvPr id="55" name="Straight Arrow Connector 54"/>
+          <p:cNvCxnSpPr/>
+          <p:nvPr/>
+        </p:nvCxnSpPr>
+        <p:spPr>
+          <a:xfrm>
+            <a:off x="3044055" y="440907"/>
+            <a:ext cx="2464676" cy="0"/>
+          </a:xfrm>
+          <a:prstGeom prst="straightConnector1">
+            <a:avLst/>
+          </a:prstGeom>
+          <a:ln w="31750">
+            <a:tailEnd type="triangle"/>
+          </a:ln>
+        </p:spPr>
+        <p:style>
+          <a:lnRef idx="1">
+            <a:schemeClr val="accent1"/>
+          </a:lnRef>
+          <a:fillRef idx="0">
+            <a:schemeClr val="accent1"/>
+          </a:fillRef>
+          <a:effectRef idx="0">
+            <a:schemeClr val="accent1"/>
+          </a:effectRef>
+          <a:fontRef idx="minor">
+            <a:schemeClr val="tx1"/>
+          </a:fontRef>
+        </p:style>
+      </p:cxnSp>
+      <p:sp>
+        <p:nvSpPr>
+          <p:cNvPr id="56" name="TextBox 55"/>
+          <p:cNvSpPr txBox="1"/>
+          <p:nvPr/>
+        </p:nvSpPr>
+        <p:spPr>
+          <a:xfrm flipH="1">
+            <a:off x="4529410" y="84841"/>
+            <a:ext cx="435487" cy="338554"/>
+          </a:xfrm>
+          <a:prstGeom prst="rect">
+            <a:avLst/>
+          </a:prstGeom>
+          <a:noFill/>
+        </p:spPr>
+        <p:txBody>
+          <a:bodyPr wrap="square" rtlCol="0">
+            <a:spAutoFit/>
+          </a:bodyPr>
+          <a:lstStyle/>
+          <a:p>
+            <a:r>
+              <a:rPr lang="en-US" sz="1600" dirty="0" smtClean="0"/>
+              <a:t>1</a:t>
+            </a:r>
+            <a:endParaRPr lang="en-US" sz="1600" dirty="0"/>
+          </a:p>
+        </p:txBody>
+      </p:sp>
+    </p:spTree>
+    <p:extLst>
+      <p:ext uri="{BB962C8B-B14F-4D97-AF65-F5344CB8AC3E}">
+        <p14:creationId xmlns:p14="http://schemas.microsoft.com/office/powerpoint/2010/main" val="698283970"/>
       </p:ext>
     </p:extLst>
   </p:cSld>

</xml_diff>